<commit_message>
typos & title issues in step9 pptx
</commit_message>
<xml_diff>
--- a/Step9/Step9-ARMGovernance.pptx
+++ b/Step9/Step9-ARMGovernance.pptx
@@ -260,7 +260,7 @@
           <a:p>
             <a:fld id="{9EB326D8-4C38-4835-91AB-B79CDC0B07B3}" type="datetimeFigureOut">
               <a:rPr lang="en-US" smtClean="0"/>
-              <a:t>4/14/2018</a:t>
+              <a:t>4/20/2018</a:t>
             </a:fld>
             <a:endParaRPr lang="en-US"/>
           </a:p>
@@ -1014,7 +1014,7 @@
           <a:p>
             <a:fld id="{38EEC551-8CDA-4EB6-89BB-2A86C9F091C8}" type="datetime8">
               <a:rPr lang="en-US" smtClean="0"/>
-              <a:t>4/14/2018 9:09 AM</a:t>
+              <a:t>4/20/2018 3:07 PM</a:t>
             </a:fld>
             <a:endParaRPr lang="en-US" dirty="0"/>
           </a:p>
@@ -8318,7 +8318,12 @@
             <p:ph type="title"/>
           </p:nvPr>
         </p:nvSpPr>
-        <p:spPr/>
+        <p:spPr>
+          <a:xfrm>
+            <a:off x="0" y="0"/>
+            <a:ext cx="8772126" cy="917575"/>
+          </a:xfrm>
+        </p:spPr>
         <p:txBody>
           <a:bodyPr/>
           <a:lstStyle/>
@@ -8337,13 +8342,13 @@
             <a:spLocks noGrp="1"/>
           </p:cNvSpPr>
           <p:nvPr>
-            <p:ph sz="quarter" idx="10"/>
+            <p:ph sz="quarter" idx="4294967295"/>
           </p:nvPr>
         </p:nvSpPr>
         <p:spPr>
           <a:xfrm>
-            <a:off x="268288" y="1176335"/>
-            <a:ext cx="11542503" cy="1846659"/>
+            <a:off x="0" y="1176338"/>
+            <a:ext cx="11542713" cy="1846262"/>
           </a:xfrm>
         </p:spPr>
         <p:txBody>
@@ -8432,7 +8437,12 @@
             <p:ph type="title"/>
           </p:nvPr>
         </p:nvSpPr>
-        <p:spPr/>
+        <p:spPr>
+          <a:xfrm>
+            <a:off x="0" y="15524"/>
+            <a:ext cx="8772126" cy="917575"/>
+          </a:xfrm>
+        </p:spPr>
         <p:txBody>
           <a:bodyPr/>
           <a:lstStyle/>
@@ -8451,13 +8461,13 @@
             <a:spLocks noGrp="1"/>
           </p:cNvSpPr>
           <p:nvPr>
-            <p:ph sz="quarter" idx="10"/>
+            <p:ph sz="quarter" idx="4294967295"/>
           </p:nvPr>
         </p:nvSpPr>
         <p:spPr>
           <a:xfrm>
-            <a:off x="268287" y="1387776"/>
-            <a:ext cx="6705167" cy="4124206"/>
+            <a:off x="0" y="1387475"/>
+            <a:ext cx="6705600" cy="4124325"/>
           </a:xfrm>
         </p:spPr>
         <p:txBody>
@@ -8926,7 +8936,12 @@
             <p:ph type="title"/>
           </p:nvPr>
         </p:nvSpPr>
-        <p:spPr/>
+        <p:spPr>
+          <a:xfrm>
+            <a:off x="-18287" y="-17573"/>
+            <a:ext cx="8772126" cy="917575"/>
+          </a:xfrm>
+        </p:spPr>
         <p:txBody>
           <a:bodyPr/>
           <a:lstStyle/>
@@ -10263,7 +10278,12 @@
             <p:ph type="title"/>
           </p:nvPr>
         </p:nvSpPr>
-        <p:spPr/>
+        <p:spPr>
+          <a:xfrm>
+            <a:off x="0" y="0"/>
+            <a:ext cx="8772126" cy="917575"/>
+          </a:xfrm>
+        </p:spPr>
         <p:txBody>
           <a:bodyPr/>
           <a:lstStyle/>
@@ -10282,17 +10302,17 @@
             <a:spLocks noGrp="1"/>
           </p:cNvSpPr>
           <p:nvPr>
-            <p:ph sz="quarter" idx="10"/>
+            <p:ph sz="quarter" idx="4294967295"/>
           </p:nvPr>
         </p:nvSpPr>
         <p:spPr>
           <a:xfrm>
-            <a:off x="270164" y="1168975"/>
-            <a:ext cx="11540627" cy="6315575"/>
+            <a:off x="0" y="1168401"/>
+            <a:ext cx="11541125" cy="4637313"/>
           </a:xfrm>
         </p:spPr>
         <p:txBody>
-          <a:bodyPr/>
+          <a:bodyPr numCol="2"/>
           <a:lstStyle/>
           <a:p>
             <a:r>
@@ -10347,6 +10367,9 @@
               <a:rPr lang="en-CA" sz="2400" dirty="0"/>
               <a:t>Effect</a:t>
             </a:r>
+          </a:p>
+          <a:p>
+            <a:endParaRPr lang="en-CA" sz="3200" dirty="0"/>
           </a:p>
           <a:p>
             <a:r>
@@ -10421,7 +10444,12 @@
             <p:ph type="title"/>
           </p:nvPr>
         </p:nvSpPr>
-        <p:spPr/>
+        <p:spPr>
+          <a:xfrm>
+            <a:off x="0" y="0"/>
+            <a:ext cx="8772126" cy="917575"/>
+          </a:xfrm>
+        </p:spPr>
         <p:txBody>
           <a:bodyPr/>
           <a:lstStyle/>
@@ -10444,13 +10472,13 @@
             <a:spLocks noGrp="1"/>
           </p:cNvSpPr>
           <p:nvPr>
-            <p:ph sz="quarter" idx="10"/>
+            <p:ph sz="quarter" idx="4294967295"/>
           </p:nvPr>
         </p:nvSpPr>
         <p:spPr>
           <a:xfrm>
-            <a:off x="268288" y="1398397"/>
-            <a:ext cx="11542503" cy="4678204"/>
+            <a:off x="0" y="1398588"/>
+            <a:ext cx="11542713" cy="4678362"/>
           </a:xfrm>
         </p:spPr>
         <p:txBody>
@@ -10539,8 +10567,8 @@
         </p:nvSpPr>
         <p:spPr>
           <a:xfrm>
-            <a:off x="268928" y="291102"/>
-            <a:ext cx="11923072" cy="899665"/>
+            <a:off x="0" y="0"/>
+            <a:ext cx="12192000" cy="917575"/>
           </a:xfrm>
         </p:spPr>
         <p:txBody>
@@ -10561,7 +10589,7 @@
             <a:picLocks noGrp="1" noChangeAspect="1"/>
           </p:cNvPicPr>
           <p:nvPr>
-            <p:ph sz="quarter" idx="10"/>
+            <p:ph sz="quarter" idx="4294967295"/>
           </p:nvPr>
         </p:nvPicPr>
         <p:blipFill>
@@ -10572,8 +10600,8 @@
         </p:blipFill>
         <p:spPr>
           <a:xfrm>
-            <a:off x="5806098" y="2155825"/>
-            <a:ext cx="6052528" cy="3607665"/>
+            <a:off x="6138863" y="2155825"/>
+            <a:ext cx="6053137" cy="3608388"/>
           </a:xfrm>
           <a:prstGeom prst="rect">
             <a:avLst/>
@@ -10880,7 +10908,12 @@
             <p:ph type="title"/>
           </p:nvPr>
         </p:nvSpPr>
-        <p:spPr/>
+        <p:spPr>
+          <a:xfrm>
+            <a:off x="0" y="0"/>
+            <a:ext cx="10692382" cy="917575"/>
+          </a:xfrm>
+        </p:spPr>
         <p:txBody>
           <a:bodyPr/>
           <a:lstStyle/>
@@ -10899,13 +10932,13 @@
             <a:spLocks noGrp="1"/>
           </p:cNvSpPr>
           <p:nvPr>
-            <p:ph sz="quarter" idx="10"/>
+            <p:ph sz="quarter" idx="4294967295"/>
           </p:nvPr>
         </p:nvSpPr>
         <p:spPr>
           <a:xfrm>
-            <a:off x="268289" y="1398397"/>
-            <a:ext cx="7633184" cy="4451560"/>
+            <a:off x="0" y="1398588"/>
+            <a:ext cx="7632700" cy="4451350"/>
           </a:xfrm>
         </p:spPr>
         <p:txBody>
@@ -11044,28 +11077,6 @@
           <a:chExt cx="0" cy="0"/>
         </a:xfrm>
       </p:grpSpPr>
-      <p:sp>
-        <p:nvSpPr>
-          <p:cNvPr id="3" name="Title 2"/>
-          <p:cNvSpPr>
-            <a:spLocks noGrp="1"/>
-          </p:cNvSpPr>
-          <p:nvPr>
-            <p:ph type="title"/>
-          </p:nvPr>
-        </p:nvSpPr>
-        <p:spPr/>
-        <p:txBody>
-          <a:bodyPr/>
-          <a:lstStyle/>
-          <a:p>
-            <a:r>
-              <a:rPr lang="en-US" dirty="0"/>
-              <a:t>Role Based Access Control (RBAC)</a:t>
-            </a:r>
-          </a:p>
-        </p:txBody>
-      </p:sp>
       <p:pic>
         <p:nvPicPr>
           <p:cNvPr id="4" name="Picture 3"/>
@@ -11090,6 +11101,39 @@
           </a:prstGeom>
         </p:spPr>
       </p:pic>
+      <p:sp>
+        <p:nvSpPr>
+          <p:cNvPr id="5" name="Title 2">
+            <a:extLst>
+              <a:ext uri="{FF2B5EF4-FFF2-40B4-BE49-F238E27FC236}">
+                <a16:creationId xmlns:a16="http://schemas.microsoft.com/office/drawing/2014/main" id="{16A8B343-AD3A-4474-BBDA-620147564049}"/>
+              </a:ext>
+            </a:extLst>
+          </p:cNvPr>
+          <p:cNvSpPr>
+            <a:spLocks noGrp="1"/>
+          </p:cNvSpPr>
+          <p:nvPr>
+            <p:ph type="title"/>
+          </p:nvPr>
+        </p:nvSpPr>
+        <p:spPr>
+          <a:xfrm>
+            <a:off x="0" y="0"/>
+            <a:ext cx="10389927" cy="917575"/>
+          </a:xfrm>
+        </p:spPr>
+        <p:txBody>
+          <a:bodyPr/>
+          <a:lstStyle/>
+          <a:p>
+            <a:r>
+              <a:rPr lang="en-US" dirty="0"/>
+              <a:t>Role Based Access Control (RBAC)</a:t>
+            </a:r>
+          </a:p>
+        </p:txBody>
+      </p:sp>
     </p:spTree>
     <p:extLst>
       <p:ext uri="{BB962C8B-B14F-4D97-AF65-F5344CB8AC3E}">
@@ -11133,7 +11177,12 @@
             <p:ph type="title"/>
           </p:nvPr>
         </p:nvSpPr>
-        <p:spPr/>
+        <p:spPr>
+          <a:xfrm>
+            <a:off x="0" y="0"/>
+            <a:ext cx="10783822" cy="917575"/>
+          </a:xfrm>
+        </p:spPr>
         <p:txBody>
           <a:bodyPr/>
           <a:lstStyle/>
@@ -11153,13 +11202,13 @@
             <a:spLocks noGrp="1"/>
           </p:cNvSpPr>
           <p:nvPr>
-            <p:ph sz="quarter" idx="10"/>
+            <p:ph sz="quarter" idx="4294967295"/>
           </p:nvPr>
         </p:nvSpPr>
         <p:spPr>
           <a:xfrm>
-            <a:off x="268288" y="1159414"/>
-            <a:ext cx="11542503" cy="7060394"/>
+            <a:off x="0" y="1158875"/>
+            <a:ext cx="11542713" cy="7061200"/>
           </a:xfrm>
         </p:spPr>
         <p:txBody>
@@ -11260,7 +11309,12 @@
             <p:ph type="title"/>
           </p:nvPr>
         </p:nvSpPr>
-        <p:spPr/>
+        <p:spPr>
+          <a:xfrm>
+            <a:off x="0" y="0"/>
+            <a:ext cx="8772126" cy="917575"/>
+          </a:xfrm>
+        </p:spPr>
         <p:txBody>
           <a:bodyPr/>
           <a:lstStyle/>
@@ -11279,13 +11333,13 @@
             <a:spLocks noGrp="1"/>
           </p:cNvSpPr>
           <p:nvPr>
-            <p:ph sz="quarter" idx="10"/>
+            <p:ph sz="quarter" idx="4294967295"/>
           </p:nvPr>
         </p:nvSpPr>
         <p:spPr>
           <a:xfrm>
-            <a:off x="268288" y="1398397"/>
-            <a:ext cx="11672700" cy="5355312"/>
+            <a:off x="519113" y="1398588"/>
+            <a:ext cx="11672887" cy="5354637"/>
           </a:xfrm>
         </p:spPr>
         <p:txBody>
@@ -11375,7 +11429,12 @@
             <p:ph type="title"/>
           </p:nvPr>
         </p:nvSpPr>
-        <p:spPr/>
+        <p:spPr>
+          <a:xfrm>
+            <a:off x="0" y="0"/>
+            <a:ext cx="8772126" cy="917575"/>
+          </a:xfrm>
+        </p:spPr>
         <p:txBody>
           <a:bodyPr/>
           <a:lstStyle/>
@@ -11394,13 +11453,13 @@
             <a:spLocks noGrp="1"/>
           </p:cNvSpPr>
           <p:nvPr>
-            <p:ph sz="quarter" idx="10"/>
+            <p:ph sz="quarter" idx="4294967295"/>
           </p:nvPr>
         </p:nvSpPr>
         <p:spPr>
           <a:xfrm>
-            <a:off x="268288" y="1398397"/>
-            <a:ext cx="11672700" cy="5232202"/>
+            <a:off x="519113" y="1398588"/>
+            <a:ext cx="11672887" cy="5232400"/>
           </a:xfrm>
         </p:spPr>
         <p:txBody>
@@ -11521,7 +11580,12 @@
             <p:ph type="title"/>
           </p:nvPr>
         </p:nvSpPr>
-        <p:spPr/>
+        <p:spPr>
+          <a:xfrm>
+            <a:off x="-1" y="0"/>
+            <a:ext cx="10121705" cy="917575"/>
+          </a:xfrm>
+        </p:spPr>
         <p:txBody>
           <a:bodyPr/>
           <a:lstStyle/>
@@ -11540,12 +11604,16 @@
             <a:graphicFrameLocks noGrp="1"/>
           </p:cNvGraphicFramePr>
           <p:nvPr>
-            <p:ph sz="quarter" idx="10"/>
-            <p:extLst/>
+            <p:ph sz="quarter" idx="4294967295"/>
+            <p:extLst>
+              <p:ext uri="{D42A27DB-BD31-4B8C-83A1-F6EECF244321}">
+                <p14:modId xmlns:p14="http://schemas.microsoft.com/office/powerpoint/2010/main" val="2820122259"/>
+              </p:ext>
+            </p:extLst>
           </p:nvPr>
         </p:nvGraphicFramePr>
         <p:xfrm>
-          <a:off x="268287" y="1398588"/>
+          <a:off x="423703" y="1719965"/>
           <a:ext cx="11344593" cy="3418070"/>
         </p:xfrm>
         <a:graphic>
@@ -12031,7 +12099,12 @@
             <p:ph type="title"/>
           </p:nvPr>
         </p:nvSpPr>
-        <p:spPr/>
+        <p:spPr>
+          <a:xfrm>
+            <a:off x="0" y="0"/>
+            <a:ext cx="8772126" cy="917575"/>
+          </a:xfrm>
+        </p:spPr>
         <p:txBody>
           <a:bodyPr/>
           <a:lstStyle/>
@@ -12050,13 +12123,13 @@
             <a:spLocks noGrp="1"/>
           </p:cNvSpPr>
           <p:nvPr>
-            <p:ph sz="quarter" idx="10"/>
+            <p:ph sz="quarter" idx="4294967295"/>
           </p:nvPr>
         </p:nvSpPr>
         <p:spPr>
           <a:xfrm>
-            <a:off x="268288" y="1387776"/>
-            <a:ext cx="5494536" cy="5109091"/>
+            <a:off x="-1" y="1387475"/>
+            <a:ext cx="7160455" cy="5110163"/>
           </a:xfrm>
         </p:spPr>
         <p:txBody>

</xml_diff>